<commit_message>
finished powerpoint, added a project
</commit_message>
<xml_diff>
--- a/Beekeeper.pptx
+++ b/Beekeeper.pptx
@@ -6820,6 +6820,80 @@
           <a:chExt cx="0" cy="0"/>
         </a:xfrm>
       </p:grpSpPr>
+      <p:pic>
+        <p:nvPicPr>
+          <p:cNvPr id="8" name="Picture 7"/>
+          <p:cNvPicPr>
+            <a:picLocks noChangeAspect="1"/>
+          </p:cNvPicPr>
+          <p:nvPr/>
+        </p:nvPicPr>
+        <p:blipFill>
+          <a:blip r:embed="rId2">
+            <a:duotone>
+              <a:schemeClr val="bg2">
+                <a:shade val="45000"/>
+                <a:satMod val="135000"/>
+              </a:schemeClr>
+              <a:prstClr val="white"/>
+            </a:duotone>
+            <a:extLst>
+              <a:ext uri="{28A0092B-C50C-407E-A947-70E740481C1C}">
+                <a14:useLocalDpi xmlns:a14="http://schemas.microsoft.com/office/drawing/2010/main" val="0"/>
+              </a:ext>
+            </a:extLst>
+          </a:blip>
+          <a:stretch>
+            <a:fillRect/>
+          </a:stretch>
+        </p:blipFill>
+        <p:spPr>
+          <a:xfrm>
+            <a:off x="6868334" y="813917"/>
+            <a:ext cx="4686712" cy="3249454"/>
+          </a:xfrm>
+          <a:prstGeom prst="rect">
+            <a:avLst/>
+          </a:prstGeom>
+        </p:spPr>
+      </p:pic>
+      <p:pic>
+        <p:nvPicPr>
+          <p:cNvPr id="7" name="Picture 6"/>
+          <p:cNvPicPr>
+            <a:picLocks noChangeAspect="1"/>
+          </p:cNvPicPr>
+          <p:nvPr/>
+        </p:nvPicPr>
+        <p:blipFill>
+          <a:blip r:embed="rId2">
+            <a:duotone>
+              <a:schemeClr val="bg2">
+                <a:shade val="45000"/>
+                <a:satMod val="135000"/>
+              </a:schemeClr>
+              <a:prstClr val="white"/>
+            </a:duotone>
+            <a:extLst>
+              <a:ext uri="{28A0092B-C50C-407E-A947-70E740481C1C}">
+                <a14:useLocalDpi xmlns:a14="http://schemas.microsoft.com/office/drawing/2010/main" val="0"/>
+              </a:ext>
+            </a:extLst>
+          </a:blip>
+          <a:stretch>
+            <a:fillRect/>
+          </a:stretch>
+        </p:blipFill>
+        <p:spPr>
+          <a:xfrm>
+            <a:off x="7505288" y="3483500"/>
+            <a:ext cx="4686712" cy="3249454"/>
+          </a:xfrm>
+          <a:prstGeom prst="rect">
+            <a:avLst/>
+          </a:prstGeom>
+        </p:spPr>
+      </p:pic>
       <p:sp>
         <p:nvSpPr>
           <p:cNvPr id="2" name="Title 1"/>
@@ -6830,16 +6904,21 @@
             <p:ph type="ctrTitle"/>
           </p:nvPr>
         </p:nvSpPr>
-        <p:spPr/>
+        <p:spPr>
+          <a:xfrm>
+            <a:off x="3748530" y="218831"/>
+            <a:ext cx="4978401" cy="2019950"/>
+          </a:xfrm>
+        </p:spPr>
         <p:txBody>
           <a:bodyPr/>
           <a:lstStyle/>
           <a:p>
             <a:r>
-              <a:rPr lang="fi-FI" dirty="0" err="1" smtClean="0"/>
+              <a:rPr lang="fi-FI" sz="7200" dirty="0" err="1" smtClean="0"/>
               <a:t>Beekeeper</a:t>
             </a:r>
-            <a:endParaRPr lang="fi-FI" dirty="0"/>
+            <a:endParaRPr lang="fi-FI" sz="7200" dirty="0"/>
           </a:p>
         </p:txBody>
       </p:sp>
@@ -6853,7 +6932,12 @@
             <p:ph type="subTitle" idx="1"/>
           </p:nvPr>
         </p:nvSpPr>
-        <p:spPr/>
+        <p:spPr>
+          <a:xfrm>
+            <a:off x="2113445" y="1696365"/>
+            <a:ext cx="8045373" cy="742279"/>
+          </a:xfrm>
+        </p:spPr>
         <p:txBody>
           <a:bodyPr/>
           <a:lstStyle/>
@@ -6895,7 +6979,7 @@
           <p:nvPr/>
         </p:nvPicPr>
         <p:blipFill>
-          <a:blip r:embed="rId2">
+          <a:blip r:embed="rId3">
             <a:extLst>
               <a:ext uri="{28A0092B-C50C-407E-A947-70E740481C1C}">
                 <a14:useLocalDpi xmlns:a14="http://schemas.microsoft.com/office/drawing/2010/main" val="0"/>
@@ -6908,7 +6992,7 @@
         </p:blipFill>
         <p:spPr>
           <a:xfrm>
-            <a:off x="484365" y="113751"/>
+            <a:off x="78154" y="707964"/>
             <a:ext cx="1730680" cy="1730680"/>
           </a:xfrm>
           <a:prstGeom prst="rect">
@@ -6925,7 +7009,7 @@
           <p:nvPr/>
         </p:nvPicPr>
         <p:blipFill>
-          <a:blip r:embed="rId2">
+          <a:blip r:embed="rId3">
             <a:extLst>
               <a:ext uri="{28A0092B-C50C-407E-A947-70E740481C1C}">
                 <a14:useLocalDpi xmlns:a14="http://schemas.microsoft.com/office/drawing/2010/main" val="0"/>
@@ -6938,7 +7022,7 @@
         </p:blipFill>
         <p:spPr>
           <a:xfrm>
-            <a:off x="2410858" y="0"/>
+            <a:off x="1629156" y="0"/>
             <a:ext cx="1171778" cy="1171778"/>
           </a:xfrm>
           <a:prstGeom prst="rect">
@@ -6946,6 +7030,71 @@
           </a:prstGeom>
         </p:spPr>
       </p:pic>
+      <p:sp>
+        <p:nvSpPr>
+          <p:cNvPr id="6" name="TextBox 5"/>
+          <p:cNvSpPr txBox="1"/>
+          <p:nvPr/>
+        </p:nvSpPr>
+        <p:spPr>
+          <a:xfrm>
+            <a:off x="2215045" y="2300148"/>
+            <a:ext cx="8323385" cy="2031325"/>
+          </a:xfrm>
+          <a:prstGeom prst="rect">
+            <a:avLst/>
+          </a:prstGeom>
+          <a:noFill/>
+        </p:spPr>
+        <p:txBody>
+          <a:bodyPr wrap="square" rtlCol="0">
+            <a:spAutoFit/>
+          </a:bodyPr>
+          <a:lstStyle/>
+          <a:p>
+            <a:r>
+              <a:rPr lang="fi-FI" dirty="0" smtClean="0"/>
+              <a:t>-Olet </a:t>
+            </a:r>
+            <a:r>
+              <a:rPr lang="fi-FI" dirty="0" err="1" smtClean="0"/>
+              <a:t>mehiläsikuningatar</a:t>
+            </a:r>
+            <a:r>
+              <a:rPr lang="fi-FI" dirty="0" smtClean="0"/>
+              <a:t>, joka komentaa työläismehiläisiä, sekä tappajamehiläisiä</a:t>
+            </a:r>
+          </a:p>
+          <a:p>
+            <a:endParaRPr lang="fi-FI" dirty="0"/>
+          </a:p>
+          <a:p>
+            <a:r>
+              <a:rPr lang="fi-FI" dirty="0" smtClean="0"/>
+              <a:t>-Kerää lisää hunajaa ja puolusta pesää ihmisiltä ja karhuilta</a:t>
+            </a:r>
+          </a:p>
+          <a:p>
+            <a:endParaRPr lang="fi-FI" dirty="0"/>
+          </a:p>
+          <a:p>
+            <a:r>
+              <a:rPr lang="fi-FI" dirty="0" smtClean="0"/>
+              <a:t>-Peli loppuu jos pesä tuhoutuu</a:t>
+            </a:r>
+          </a:p>
+          <a:p>
+            <a:endParaRPr lang="fi-FI" dirty="0" smtClean="0"/>
+          </a:p>
+          <a:p>
+            <a:r>
+              <a:rPr lang="fi-FI" dirty="0" smtClean="0"/>
+              <a:t>-Mitä enemmän hunajaa, sitä korkeampi pistemäärä</a:t>
+            </a:r>
+            <a:endParaRPr lang="fi-FI" dirty="0"/>
+          </a:p>
+        </p:txBody>
+      </p:sp>
     </p:spTree>
     <p:extLst>
       <p:ext uri="{BB962C8B-B14F-4D97-AF65-F5344CB8AC3E}">

</xml_diff>